<commit_message>
Updated sensors class hierarchy diagram
</commit_message>
<xml_diff>
--- a/extras/media/sensors.pptx
+++ b/extras/media/sensors.pptx
@@ -53,7 +53,7 @@
       </p:grpSpPr>
       <p:sp>
         <p:nvSpPr>
-          <p:cNvPr id="23" name="PlaceHolder 1"/>
+          <p:cNvPr id="21" name="PlaceHolder 1"/>
           <p:cNvSpPr>
             <a:spLocks noGrp="1"/>
           </p:cNvSpPr>
@@ -82,7 +82,7 @@
       </p:sp>
       <p:sp>
         <p:nvSpPr>
-          <p:cNvPr id="24" name="PlaceHolder 2"/>
+          <p:cNvPr id="22" name="PlaceHolder 2"/>
           <p:cNvSpPr>
             <a:spLocks noGrp="1"/>
           </p:cNvSpPr>
@@ -112,7 +112,7 @@
       </p:sp>
       <p:sp>
         <p:nvSpPr>
-          <p:cNvPr id="25" name="PlaceHolder 3"/>
+          <p:cNvPr id="23" name="PlaceHolder 3"/>
           <p:cNvSpPr>
             <a:spLocks noGrp="1"/>
           </p:cNvSpPr>
@@ -164,7 +164,7 @@
       </p:grpSpPr>
       <p:sp>
         <p:nvSpPr>
-          <p:cNvPr id="26" name="PlaceHolder 1"/>
+          <p:cNvPr id="24" name="PlaceHolder 1"/>
           <p:cNvSpPr>
             <a:spLocks noGrp="1"/>
           </p:cNvSpPr>
@@ -193,7 +193,7 @@
       </p:sp>
       <p:sp>
         <p:nvSpPr>
-          <p:cNvPr id="27" name="PlaceHolder 2"/>
+          <p:cNvPr id="25" name="PlaceHolder 2"/>
           <p:cNvSpPr>
             <a:spLocks noGrp="1"/>
           </p:cNvSpPr>
@@ -223,7 +223,7 @@
       </p:sp>
       <p:sp>
         <p:nvSpPr>
-          <p:cNvPr id="28" name="PlaceHolder 3"/>
+          <p:cNvPr id="26" name="PlaceHolder 3"/>
           <p:cNvSpPr>
             <a:spLocks noGrp="1"/>
           </p:cNvSpPr>
@@ -253,7 +253,7 @@
       </p:sp>
       <p:sp>
         <p:nvSpPr>
-          <p:cNvPr id="29" name="PlaceHolder 4"/>
+          <p:cNvPr id="27" name="PlaceHolder 4"/>
           <p:cNvSpPr>
             <a:spLocks noGrp="1"/>
           </p:cNvSpPr>
@@ -283,7 +283,7 @@
       </p:sp>
       <p:sp>
         <p:nvSpPr>
-          <p:cNvPr id="30" name="PlaceHolder 5"/>
+          <p:cNvPr id="28" name="PlaceHolder 5"/>
           <p:cNvSpPr>
             <a:spLocks noGrp="1"/>
           </p:cNvSpPr>
@@ -335,7 +335,7 @@
       </p:grpSpPr>
       <p:sp>
         <p:nvSpPr>
-          <p:cNvPr id="31" name="PlaceHolder 1"/>
+          <p:cNvPr id="29" name="PlaceHolder 1"/>
           <p:cNvSpPr>
             <a:spLocks noGrp="1"/>
           </p:cNvSpPr>
@@ -364,7 +364,7 @@
       </p:sp>
       <p:sp>
         <p:nvSpPr>
-          <p:cNvPr id="32" name="PlaceHolder 2"/>
+          <p:cNvPr id="30" name="PlaceHolder 2"/>
           <p:cNvSpPr>
             <a:spLocks noGrp="1"/>
           </p:cNvSpPr>
@@ -394,7 +394,7 @@
       </p:sp>
       <p:sp>
         <p:nvSpPr>
-          <p:cNvPr id="33" name="PlaceHolder 3"/>
+          <p:cNvPr id="31" name="PlaceHolder 3"/>
           <p:cNvSpPr>
             <a:spLocks noGrp="1"/>
           </p:cNvSpPr>
@@ -424,7 +424,7 @@
       </p:sp>
       <p:sp>
         <p:nvSpPr>
-          <p:cNvPr id="34" name="PlaceHolder 4"/>
+          <p:cNvPr id="32" name="PlaceHolder 4"/>
           <p:cNvSpPr>
             <a:spLocks noGrp="1"/>
           </p:cNvSpPr>
@@ -454,7 +454,7 @@
       </p:sp>
       <p:sp>
         <p:nvSpPr>
-          <p:cNvPr id="35" name="PlaceHolder 5"/>
+          <p:cNvPr id="33" name="PlaceHolder 5"/>
           <p:cNvSpPr>
             <a:spLocks noGrp="1"/>
           </p:cNvSpPr>
@@ -484,7 +484,7 @@
       </p:sp>
       <p:sp>
         <p:nvSpPr>
-          <p:cNvPr id="36" name="PlaceHolder 6"/>
+          <p:cNvPr id="34" name="PlaceHolder 6"/>
           <p:cNvSpPr>
             <a:spLocks noGrp="1"/>
           </p:cNvSpPr>
@@ -514,7 +514,7 @@
       </p:sp>
       <p:sp>
         <p:nvSpPr>
-          <p:cNvPr id="37" name="PlaceHolder 7"/>
+          <p:cNvPr id="35" name="PlaceHolder 7"/>
           <p:cNvSpPr>
             <a:spLocks noGrp="1"/>
           </p:cNvSpPr>
@@ -566,7 +566,7 @@
       </p:grpSpPr>
       <p:sp>
         <p:nvSpPr>
-          <p:cNvPr id="2" name="PlaceHolder 1"/>
+          <p:cNvPr id="0" name="PlaceHolder 1"/>
           <p:cNvSpPr>
             <a:spLocks noGrp="1"/>
           </p:cNvSpPr>
@@ -595,7 +595,7 @@
       </p:sp>
       <p:sp>
         <p:nvSpPr>
-          <p:cNvPr id="3" name="PlaceHolder 2"/>
+          <p:cNvPr id="1" name="PlaceHolder 2"/>
           <p:cNvSpPr>
             <a:spLocks noGrp="1"/>
           </p:cNvSpPr>
@@ -646,7 +646,7 @@
       </p:grpSpPr>
       <p:sp>
         <p:nvSpPr>
-          <p:cNvPr id="4" name="PlaceHolder 1"/>
+          <p:cNvPr id="2" name="PlaceHolder 1"/>
           <p:cNvSpPr>
             <a:spLocks noGrp="1"/>
           </p:cNvSpPr>
@@ -675,7 +675,7 @@
       </p:sp>
       <p:sp>
         <p:nvSpPr>
-          <p:cNvPr id="5" name="PlaceHolder 2"/>
+          <p:cNvPr id="3" name="PlaceHolder 2"/>
           <p:cNvSpPr>
             <a:spLocks noGrp="1"/>
           </p:cNvSpPr>
@@ -727,7 +727,7 @@
       </p:grpSpPr>
       <p:sp>
         <p:nvSpPr>
-          <p:cNvPr id="6" name="PlaceHolder 1"/>
+          <p:cNvPr id="4" name="PlaceHolder 1"/>
           <p:cNvSpPr>
             <a:spLocks noGrp="1"/>
           </p:cNvSpPr>
@@ -756,7 +756,7 @@
       </p:sp>
       <p:sp>
         <p:nvSpPr>
-          <p:cNvPr id="7" name="PlaceHolder 2"/>
+          <p:cNvPr id="5" name="PlaceHolder 2"/>
           <p:cNvSpPr>
             <a:spLocks noGrp="1"/>
           </p:cNvSpPr>
@@ -786,7 +786,7 @@
       </p:sp>
       <p:sp>
         <p:nvSpPr>
-          <p:cNvPr id="8" name="PlaceHolder 3"/>
+          <p:cNvPr id="6" name="PlaceHolder 3"/>
           <p:cNvSpPr>
             <a:spLocks noGrp="1"/>
           </p:cNvSpPr>
@@ -838,7 +838,7 @@
       </p:grpSpPr>
       <p:sp>
         <p:nvSpPr>
-          <p:cNvPr id="9" name="PlaceHolder 1"/>
+          <p:cNvPr id="7" name="PlaceHolder 1"/>
           <p:cNvSpPr>
             <a:spLocks noGrp="1"/>
           </p:cNvSpPr>
@@ -889,7 +889,7 @@
       </p:grpSpPr>
       <p:sp>
         <p:nvSpPr>
-          <p:cNvPr id="10" name="PlaceHolder 1"/>
+          <p:cNvPr id="8" name="PlaceHolder 1"/>
           <p:cNvSpPr>
             <a:spLocks noGrp="1"/>
           </p:cNvSpPr>
@@ -940,7 +940,7 @@
       </p:grpSpPr>
       <p:sp>
         <p:nvSpPr>
-          <p:cNvPr id="11" name="PlaceHolder 1"/>
+          <p:cNvPr id="9" name="PlaceHolder 1"/>
           <p:cNvSpPr>
             <a:spLocks noGrp="1"/>
           </p:cNvSpPr>
@@ -969,7 +969,7 @@
       </p:sp>
       <p:sp>
         <p:nvSpPr>
-          <p:cNvPr id="12" name="PlaceHolder 2"/>
+          <p:cNvPr id="10" name="PlaceHolder 2"/>
           <p:cNvSpPr>
             <a:spLocks noGrp="1"/>
           </p:cNvSpPr>
@@ -999,7 +999,7 @@
       </p:sp>
       <p:sp>
         <p:nvSpPr>
-          <p:cNvPr id="13" name="PlaceHolder 3"/>
+          <p:cNvPr id="11" name="PlaceHolder 3"/>
           <p:cNvSpPr>
             <a:spLocks noGrp="1"/>
           </p:cNvSpPr>
@@ -1029,7 +1029,7 @@
       </p:sp>
       <p:sp>
         <p:nvSpPr>
-          <p:cNvPr id="14" name="PlaceHolder 4"/>
+          <p:cNvPr id="12" name="PlaceHolder 4"/>
           <p:cNvSpPr>
             <a:spLocks noGrp="1"/>
           </p:cNvSpPr>
@@ -1081,7 +1081,7 @@
       </p:grpSpPr>
       <p:sp>
         <p:nvSpPr>
-          <p:cNvPr id="15" name="PlaceHolder 1"/>
+          <p:cNvPr id="13" name="PlaceHolder 1"/>
           <p:cNvSpPr>
             <a:spLocks noGrp="1"/>
           </p:cNvSpPr>
@@ -1110,7 +1110,7 @@
       </p:sp>
       <p:sp>
         <p:nvSpPr>
-          <p:cNvPr id="16" name="PlaceHolder 2"/>
+          <p:cNvPr id="14" name="PlaceHolder 2"/>
           <p:cNvSpPr>
             <a:spLocks noGrp="1"/>
           </p:cNvSpPr>
@@ -1140,7 +1140,7 @@
       </p:sp>
       <p:sp>
         <p:nvSpPr>
-          <p:cNvPr id="17" name="PlaceHolder 3"/>
+          <p:cNvPr id="15" name="PlaceHolder 3"/>
           <p:cNvSpPr>
             <a:spLocks noGrp="1"/>
           </p:cNvSpPr>
@@ -1170,7 +1170,7 @@
       </p:sp>
       <p:sp>
         <p:nvSpPr>
-          <p:cNvPr id="18" name="PlaceHolder 4"/>
+          <p:cNvPr id="16" name="PlaceHolder 4"/>
           <p:cNvSpPr>
             <a:spLocks noGrp="1"/>
           </p:cNvSpPr>
@@ -1222,7 +1222,7 @@
       </p:grpSpPr>
       <p:sp>
         <p:nvSpPr>
-          <p:cNvPr id="19" name="PlaceHolder 1"/>
+          <p:cNvPr id="17" name="PlaceHolder 1"/>
           <p:cNvSpPr>
             <a:spLocks noGrp="1"/>
           </p:cNvSpPr>
@@ -1251,7 +1251,7 @@
       </p:sp>
       <p:sp>
         <p:nvSpPr>
-          <p:cNvPr id="20" name="PlaceHolder 2"/>
+          <p:cNvPr id="18" name="PlaceHolder 2"/>
           <p:cNvSpPr>
             <a:spLocks noGrp="1"/>
           </p:cNvSpPr>
@@ -1281,7 +1281,7 @@
       </p:sp>
       <p:sp>
         <p:nvSpPr>
-          <p:cNvPr id="21" name="PlaceHolder 3"/>
+          <p:cNvPr id="19" name="PlaceHolder 3"/>
           <p:cNvSpPr>
             <a:spLocks noGrp="1"/>
           </p:cNvSpPr>
@@ -1311,7 +1311,7 @@
       </p:sp>
       <p:sp>
         <p:nvSpPr>
-          <p:cNvPr id="22" name="PlaceHolder 4"/>
+          <p:cNvPr id="20" name="PlaceHolder 4"/>
           <p:cNvSpPr>
             <a:spLocks noGrp="1"/>
           </p:cNvSpPr>
@@ -1361,220 +1361,6 @@
           <a:chExt cx="0" cy="0"/>
         </a:xfrm>
       </p:grpSpPr>
-      <p:sp>
-        <p:nvSpPr>
-          <p:cNvPr id="0" name="PlaceHolder 1"/>
-          <p:cNvSpPr>
-            <a:spLocks noGrp="1"/>
-          </p:cNvSpPr>
-          <p:nvPr>
-            <p:ph type="title"/>
-          </p:nvPr>
-        </p:nvSpPr>
-        <p:spPr>
-          <a:xfrm>
-            <a:off x="504000" y="301320"/>
-            <a:ext cx="9072000" cy="1261800"/>
-          </a:xfrm>
-          <a:prstGeom prst="rect">
-            <a:avLst/>
-          </a:prstGeom>
-        </p:spPr>
-        <p:txBody>
-          <a:bodyPr lIns="0" rIns="0" tIns="0" bIns="0" anchor="ctr"/>
-          <a:p>
-            <a:pPr algn="ctr"/>
-            <a:r>
-              <a:rPr b="0" lang="en-US" sz="4400" spc="-1" strike="noStrike">
-                <a:latin typeface="Arial"/>
-              </a:rPr>
-              <a:t>Click to edit the title text format</a:t>
-            </a:r>
-            <a:endParaRPr b="0" lang="en-US" sz="4400" spc="-1" strike="noStrike">
-              <a:latin typeface="Arial"/>
-            </a:endParaRPr>
-          </a:p>
-        </p:txBody>
-      </p:sp>
-      <p:sp>
-        <p:nvSpPr>
-          <p:cNvPr id="1" name="PlaceHolder 2"/>
-          <p:cNvSpPr>
-            <a:spLocks noGrp="1"/>
-          </p:cNvSpPr>
-          <p:nvPr>
-            <p:ph type="body"/>
-          </p:nvPr>
-        </p:nvSpPr>
-        <p:spPr>
-          <a:xfrm>
-            <a:off x="504000" y="1768680"/>
-            <a:ext cx="9072000" cy="4384080"/>
-          </a:xfrm>
-          <a:prstGeom prst="rect">
-            <a:avLst/>
-          </a:prstGeom>
-        </p:spPr>
-        <p:txBody>
-          <a:bodyPr lIns="0" rIns="0" tIns="0" bIns="0">
-            <a:normAutofit/>
-          </a:bodyPr>
-          <a:p>
-            <a:pPr marL="432000" indent="-324000">
-              <a:spcBef>
-                <a:spcPts val="1417"/>
-              </a:spcBef>
-              <a:buClr>
-                <a:srgbClr val="000000"/>
-              </a:buClr>
-              <a:buSzPct val="45000"/>
-              <a:buFont typeface="Wingdings" charset="2"/>
-              <a:buChar char=""/>
-            </a:pPr>
-            <a:r>
-              <a:rPr b="0" lang="en-US" sz="3200" spc="-1" strike="noStrike">
-                <a:latin typeface="Arial"/>
-              </a:rPr>
-              <a:t>Click to edit the outline text format</a:t>
-            </a:r>
-            <a:endParaRPr b="0" lang="en-US" sz="3200" spc="-1" strike="noStrike">
-              <a:latin typeface="Arial"/>
-            </a:endParaRPr>
-          </a:p>
-          <a:p>
-            <a:pPr lvl="1" marL="864000" indent="-324000">
-              <a:spcBef>
-                <a:spcPts val="1134"/>
-              </a:spcBef>
-              <a:buClr>
-                <a:srgbClr val="000000"/>
-              </a:buClr>
-              <a:buSzPct val="75000"/>
-              <a:buFont typeface="Symbol" charset="2"/>
-              <a:buChar char=""/>
-            </a:pPr>
-            <a:r>
-              <a:rPr b="0" lang="en-US" sz="2800" spc="-1" strike="noStrike">
-                <a:latin typeface="Arial"/>
-              </a:rPr>
-              <a:t>Second Outline Level</a:t>
-            </a:r>
-            <a:endParaRPr b="0" lang="en-US" sz="2800" spc="-1" strike="noStrike">
-              <a:latin typeface="Arial"/>
-            </a:endParaRPr>
-          </a:p>
-          <a:p>
-            <a:pPr lvl="2" marL="1296000" indent="-288000">
-              <a:spcBef>
-                <a:spcPts val="850"/>
-              </a:spcBef>
-              <a:buClr>
-                <a:srgbClr val="000000"/>
-              </a:buClr>
-              <a:buSzPct val="45000"/>
-              <a:buFont typeface="Wingdings" charset="2"/>
-              <a:buChar char=""/>
-            </a:pPr>
-            <a:r>
-              <a:rPr b="0" lang="en-US" sz="2400" spc="-1" strike="noStrike">
-                <a:latin typeface="Arial"/>
-              </a:rPr>
-              <a:t>Third Outline Level</a:t>
-            </a:r>
-            <a:endParaRPr b="0" lang="en-US" sz="2400" spc="-1" strike="noStrike">
-              <a:latin typeface="Arial"/>
-            </a:endParaRPr>
-          </a:p>
-          <a:p>
-            <a:pPr lvl="3" marL="1728000" indent="-216000">
-              <a:spcBef>
-                <a:spcPts val="567"/>
-              </a:spcBef>
-              <a:buClr>
-                <a:srgbClr val="000000"/>
-              </a:buClr>
-              <a:buSzPct val="75000"/>
-              <a:buFont typeface="Symbol" charset="2"/>
-              <a:buChar char=""/>
-            </a:pPr>
-            <a:r>
-              <a:rPr b="0" lang="en-US" sz="2000" spc="-1" strike="noStrike">
-                <a:latin typeface="Arial"/>
-              </a:rPr>
-              <a:t>Fourth Outline Level</a:t>
-            </a:r>
-            <a:endParaRPr b="0" lang="en-US" sz="2000" spc="-1" strike="noStrike">
-              <a:latin typeface="Arial"/>
-            </a:endParaRPr>
-          </a:p>
-          <a:p>
-            <a:pPr lvl="4" marL="2160000" indent="-216000">
-              <a:spcBef>
-                <a:spcPts val="283"/>
-              </a:spcBef>
-              <a:buClr>
-                <a:srgbClr val="000000"/>
-              </a:buClr>
-              <a:buSzPct val="45000"/>
-              <a:buFont typeface="Wingdings" charset="2"/>
-              <a:buChar char=""/>
-            </a:pPr>
-            <a:r>
-              <a:rPr b="0" lang="en-US" sz="2000" spc="-1" strike="noStrike">
-                <a:latin typeface="Arial"/>
-              </a:rPr>
-              <a:t>Fifth Outline Level</a:t>
-            </a:r>
-            <a:endParaRPr b="0" lang="en-US" sz="2000" spc="-1" strike="noStrike">
-              <a:latin typeface="Arial"/>
-            </a:endParaRPr>
-          </a:p>
-          <a:p>
-            <a:pPr lvl="5" marL="2592000" indent="-216000">
-              <a:spcBef>
-                <a:spcPts val="283"/>
-              </a:spcBef>
-              <a:buClr>
-                <a:srgbClr val="000000"/>
-              </a:buClr>
-              <a:buSzPct val="45000"/>
-              <a:buFont typeface="Wingdings" charset="2"/>
-              <a:buChar char=""/>
-            </a:pPr>
-            <a:r>
-              <a:rPr b="0" lang="en-US" sz="2000" spc="-1" strike="noStrike">
-                <a:latin typeface="Arial"/>
-              </a:rPr>
-              <a:t>Sixth Outline Level</a:t>
-            </a:r>
-            <a:endParaRPr b="0" lang="en-US" sz="2000" spc="-1" strike="noStrike">
-              <a:latin typeface="Arial"/>
-            </a:endParaRPr>
-          </a:p>
-          <a:p>
-            <a:pPr lvl="6" marL="3024000" indent="-216000">
-              <a:spcBef>
-                <a:spcPts val="283"/>
-              </a:spcBef>
-              <a:buClr>
-                <a:srgbClr val="000000"/>
-              </a:buClr>
-              <a:buSzPct val="45000"/>
-              <a:buFont typeface="Wingdings" charset="2"/>
-              <a:buChar char=""/>
-            </a:pPr>
-            <a:r>
-              <a:rPr b="0" lang="en-US" sz="2000" spc="-1" strike="noStrike">
-                <a:latin typeface="Arial"/>
-              </a:rPr>
-              <a:t>Seventh Outline Level</a:t>
-            </a:r>
-            <a:endParaRPr b="0" lang="en-US" sz="2000" spc="-1" strike="noStrike">
-              <a:latin typeface="Arial"/>
-            </a:endParaRPr>
-          </a:p>
-        </p:txBody>
-      </p:sp>
     </p:spTree>
   </p:cSld>
   <p:clrMap bg1="lt1" bg2="lt2" tx1="dk1" tx2="dk2" accent1="accent1" accent2="accent2" accent3="accent3" accent4="accent4" accent5="accent5" accent6="accent6" hlink="hlink" folHlink="folHlink"/>
@@ -1614,14 +1400,14 @@
       </p:grpSpPr>
       <p:sp>
         <p:nvSpPr>
-          <p:cNvPr id="38" name="CustomShape 1"/>
+          <p:cNvPr id="36" name="CustomShape 1"/>
           <p:cNvSpPr/>
           <p:nvPr/>
         </p:nvSpPr>
         <p:spPr>
           <a:xfrm>
             <a:off x="4195080" y="457200"/>
-            <a:ext cx="924480" cy="314640"/>
+            <a:ext cx="924120" cy="314280"/>
           </a:xfrm>
           <a:prstGeom prst="rect">
             <a:avLst/>
@@ -1663,14 +1449,14 @@
       </p:sp>
       <p:sp>
         <p:nvSpPr>
-          <p:cNvPr id="39" name="CustomShape 2"/>
+          <p:cNvPr id="37" name="CustomShape 2"/>
           <p:cNvSpPr/>
           <p:nvPr/>
         </p:nvSpPr>
         <p:spPr>
           <a:xfrm>
             <a:off x="1280160" y="1513080"/>
-            <a:ext cx="1919160" cy="314640"/>
+            <a:ext cx="1918800" cy="314280"/>
           </a:xfrm>
           <a:prstGeom prst="rect">
             <a:avLst/>
@@ -1712,14 +1498,14 @@
       </p:sp>
       <p:sp>
         <p:nvSpPr>
-          <p:cNvPr id="40" name="CustomShape 3"/>
+          <p:cNvPr id="38" name="CustomShape 3"/>
           <p:cNvSpPr/>
           <p:nvPr/>
         </p:nvSpPr>
         <p:spPr>
           <a:xfrm>
             <a:off x="113760" y="2286000"/>
-            <a:ext cx="1073880" cy="314640"/>
+            <a:ext cx="1073520" cy="314280"/>
           </a:xfrm>
           <a:prstGeom prst="rect">
             <a:avLst/>
@@ -1761,14 +1547,14 @@
       </p:sp>
       <p:sp>
         <p:nvSpPr>
-          <p:cNvPr id="41" name="CustomShape 4"/>
+          <p:cNvPr id="39" name="CustomShape 4"/>
           <p:cNvSpPr/>
           <p:nvPr/>
         </p:nvSpPr>
         <p:spPr>
           <a:xfrm>
             <a:off x="1121760" y="2286000"/>
-            <a:ext cx="1071720" cy="314640"/>
+            <a:ext cx="1071360" cy="314280"/>
           </a:xfrm>
           <a:prstGeom prst="rect">
             <a:avLst/>
@@ -1810,14 +1596,14 @@
       </p:sp>
       <p:sp>
         <p:nvSpPr>
-          <p:cNvPr id="42" name="CustomShape 5"/>
+          <p:cNvPr id="40" name="CustomShape 5"/>
           <p:cNvSpPr/>
           <p:nvPr/>
         </p:nvSpPr>
         <p:spPr>
           <a:xfrm>
             <a:off x="2129760" y="2286000"/>
-            <a:ext cx="1343880" cy="314640"/>
+            <a:ext cx="1343520" cy="314280"/>
           </a:xfrm>
           <a:prstGeom prst="rect">
             <a:avLst/>
@@ -1859,14 +1645,14 @@
       </p:sp>
       <p:sp>
         <p:nvSpPr>
-          <p:cNvPr id="43" name="CustomShape 6"/>
+          <p:cNvPr id="41" name="CustomShape 6"/>
           <p:cNvSpPr/>
           <p:nvPr/>
         </p:nvSpPr>
         <p:spPr>
           <a:xfrm>
             <a:off x="3389760" y="2286000"/>
-            <a:ext cx="1330920" cy="314640"/>
+            <a:ext cx="1330560" cy="314280"/>
           </a:xfrm>
           <a:prstGeom prst="rect">
             <a:avLst/>
@@ -1908,14 +1694,14 @@
       </p:sp>
       <p:sp>
         <p:nvSpPr>
-          <p:cNvPr id="44" name="CustomShape 7"/>
+          <p:cNvPr id="42" name="CustomShape 7"/>
           <p:cNvSpPr/>
           <p:nvPr/>
         </p:nvSpPr>
         <p:spPr>
           <a:xfrm>
             <a:off x="4721760" y="2286000"/>
-            <a:ext cx="1037880" cy="314640"/>
+            <a:ext cx="1037520" cy="314280"/>
           </a:xfrm>
           <a:prstGeom prst="rect">
             <a:avLst/>
@@ -1957,14 +1743,14 @@
       </p:sp>
       <p:sp>
         <p:nvSpPr>
-          <p:cNvPr id="45" name="CustomShape 8"/>
+          <p:cNvPr id="43" name="CustomShape 8"/>
           <p:cNvSpPr/>
           <p:nvPr/>
         </p:nvSpPr>
         <p:spPr>
           <a:xfrm>
-            <a:off x="7868520" y="1508760"/>
-            <a:ext cx="1473120" cy="314640"/>
+            <a:off x="6284520" y="1508760"/>
+            <a:ext cx="1472760" cy="314280"/>
           </a:xfrm>
           <a:prstGeom prst="rect">
             <a:avLst/>
@@ -2006,106 +1792,14 @@
       </p:sp>
       <p:sp>
         <p:nvSpPr>
-          <p:cNvPr id="46" name="CustomShape 9"/>
+          <p:cNvPr id="44" name="CustomShape 9"/>
           <p:cNvSpPr/>
           <p:nvPr/>
         </p:nvSpPr>
         <p:spPr>
-          <a:xfrm>
-            <a:off x="3937680" y="1513080"/>
-            <a:ext cx="724680" cy="314640"/>
-          </a:xfrm>
-          <a:prstGeom prst="rect">
-            <a:avLst/>
-          </a:prstGeom>
-          <a:noFill/>
-          <a:ln>
-            <a:noFill/>
-          </a:ln>
-        </p:spPr>
-        <p:style>
-          <a:lnRef idx="0"/>
-          <a:fillRef idx="0"/>
-          <a:effectRef idx="0"/>
-          <a:fontRef idx="minor"/>
-        </p:style>
-        <p:txBody>
-          <a:bodyPr lIns="90000" rIns="90000" tIns="45000" bIns="45000"/>
-          <a:p>
-            <a:pPr>
-              <a:lnSpc>
-                <a:spcPct val="100000"/>
-              </a:lnSpc>
-            </a:pPr>
-            <a:r>
-              <a:rPr b="0" lang="en-US" sz="1400" spc="-1" strike="noStrike">
-                <a:solidFill>
-                  <a:srgbClr val="000000"/>
-                </a:solidFill>
-                <a:latin typeface="Arial"/>
-                <a:ea typeface="DejaVu Sans"/>
-              </a:rPr>
-              <a:t>Board</a:t>
-            </a:r>
-            <a:endParaRPr b="0" lang="en-US" sz="1400" spc="-1" strike="noStrike">
-              <a:latin typeface="Arial"/>
-            </a:endParaRPr>
-          </a:p>
-        </p:txBody>
-      </p:sp>
-      <p:sp>
-        <p:nvSpPr>
-          <p:cNvPr id="47" name="CustomShape 10"/>
-          <p:cNvSpPr/>
-          <p:nvPr/>
-        </p:nvSpPr>
-        <p:spPr>
-          <a:xfrm>
-            <a:off x="3200040" y="1670760"/>
-            <a:ext cx="737280" cy="360"/>
-          </a:xfrm>
-          <a:custGeom>
-            <a:avLst/>
-            <a:gdLst/>
-            <a:ahLst/>
-            <a:rect l="l" t="t" r="r" b="b"/>
-            <a:pathLst>
-              <a:path w="21600" h="21600">
-                <a:moveTo>
-                  <a:pt x="0" y="0"/>
-                </a:moveTo>
-                <a:lnTo>
-                  <a:pt x="21600" y="21600"/>
-                </a:lnTo>
-              </a:path>
-            </a:pathLst>
-          </a:custGeom>
-          <a:noFill/>
-          <a:ln>
-            <a:solidFill>
-              <a:srgbClr val="000000"/>
-            </a:solidFill>
-            <a:headEnd len="med" type="triangle" w="med"/>
-            <a:tailEnd len="med" type="triangle" w="med"/>
-          </a:ln>
-        </p:spPr>
-        <p:style>
-          <a:lnRef idx="0"/>
-          <a:fillRef idx="0"/>
-          <a:effectRef idx="0"/>
-          <a:fontRef idx="minor"/>
-        </p:style>
-      </p:sp>
-      <p:sp>
-        <p:nvSpPr>
-          <p:cNvPr id="48" name="CustomShape 11"/>
-          <p:cNvSpPr/>
-          <p:nvPr/>
-        </p:nvSpPr>
-        <p:spPr>
           <a:xfrm flipH="1">
             <a:off x="2239200" y="772200"/>
-            <a:ext cx="2417400" cy="740880"/>
+            <a:ext cx="2417040" cy="740520"/>
           </a:xfrm>
           <a:custGeom>
             <a:avLst/>
@@ -2139,14 +1833,14 @@
       </p:sp>
       <p:sp>
         <p:nvSpPr>
-          <p:cNvPr id="49" name="CustomShape 12"/>
+          <p:cNvPr id="45" name="CustomShape 10"/>
           <p:cNvSpPr/>
           <p:nvPr/>
         </p:nvSpPr>
         <p:spPr>
-          <a:xfrm>
-            <a:off x="4657680" y="772200"/>
-            <a:ext cx="3846240" cy="782280"/>
+          <a:xfrm flipH="1">
+            <a:off x="650160" y="1828080"/>
+            <a:ext cx="1588680" cy="457560"/>
           </a:xfrm>
           <a:custGeom>
             <a:avLst/>
@@ -2180,14 +1874,14 @@
       </p:sp>
       <p:sp>
         <p:nvSpPr>
-          <p:cNvPr id="50" name="CustomShape 13"/>
+          <p:cNvPr id="46" name="CustomShape 11"/>
           <p:cNvSpPr/>
           <p:nvPr/>
         </p:nvSpPr>
         <p:spPr>
           <a:xfrm flipH="1">
-            <a:off x="650880" y="1828080"/>
-            <a:ext cx="1589040" cy="457920"/>
+            <a:off x="1657080" y="1828080"/>
+            <a:ext cx="581760" cy="457560"/>
           </a:xfrm>
           <a:custGeom>
             <a:avLst/>
@@ -2221,14 +1915,14 @@
       </p:sp>
       <p:sp>
         <p:nvSpPr>
-          <p:cNvPr id="51" name="CustomShape 14"/>
+          <p:cNvPr id="47" name="CustomShape 12"/>
           <p:cNvSpPr/>
           <p:nvPr/>
         </p:nvSpPr>
         <p:spPr>
-          <a:xfrm flipH="1">
-            <a:off x="1657080" y="1828080"/>
-            <a:ext cx="582120" cy="457920"/>
+          <a:xfrm>
+            <a:off x="2240280" y="1828080"/>
+            <a:ext cx="561240" cy="457560"/>
           </a:xfrm>
           <a:custGeom>
             <a:avLst/>
@@ -2262,14 +1956,14 @@
       </p:sp>
       <p:sp>
         <p:nvSpPr>
-          <p:cNvPr id="52" name="CustomShape 15"/>
+          <p:cNvPr id="48" name="CustomShape 13"/>
           <p:cNvSpPr/>
           <p:nvPr/>
         </p:nvSpPr>
         <p:spPr>
           <a:xfrm>
             <a:off x="2240280" y="1828080"/>
-            <a:ext cx="561600" cy="457920"/>
+            <a:ext cx="1814760" cy="457560"/>
           </a:xfrm>
           <a:custGeom>
             <a:avLst/>
@@ -2303,14 +1997,14 @@
       </p:sp>
       <p:sp>
         <p:nvSpPr>
-          <p:cNvPr id="53" name="CustomShape 16"/>
+          <p:cNvPr id="49" name="CustomShape 14"/>
           <p:cNvSpPr/>
           <p:nvPr/>
         </p:nvSpPr>
         <p:spPr>
           <a:xfrm>
             <a:off x="2240280" y="1828080"/>
-            <a:ext cx="1815120" cy="457920"/>
+            <a:ext cx="3000240" cy="457560"/>
           </a:xfrm>
           <a:custGeom>
             <a:avLst/>
@@ -2342,270 +2036,30 @@
           <a:fontRef idx="minor"/>
         </p:style>
       </p:sp>
-      <p:sp>
-        <p:nvSpPr>
-          <p:cNvPr id="54" name="CustomShape 17"/>
-          <p:cNvSpPr/>
+      <p:cxnSp>
+        <p:nvCxnSpPr>
+          <p:cNvPr id="50" name="Line 15"/>
+          <p:cNvCxnSpPr>
+            <a:stCxn id="36" idx="2"/>
+            <a:endCxn id="43" idx="0"/>
+          </p:cNvCxnSpPr>
           <p:nvPr/>
-        </p:nvSpPr>
-        <p:spPr>
-          <a:xfrm>
-            <a:off x="2240280" y="1828080"/>
-            <a:ext cx="3000600" cy="457920"/>
-          </a:xfrm>
-          <a:custGeom>
-            <a:avLst/>
-            <a:gdLst/>
-            <a:ahLst/>
-            <a:rect l="l" t="t" r="r" b="b"/>
-            <a:pathLst>
-              <a:path w="21600" h="21600">
-                <a:moveTo>
-                  <a:pt x="0" y="0"/>
-                </a:moveTo>
-                <a:lnTo>
-                  <a:pt x="21600" y="21600"/>
-                </a:lnTo>
-              </a:path>
-            </a:pathLst>
-          </a:custGeom>
-          <a:noFill/>
+        </p:nvCxnSpPr>
+        <p:spPr>
+          <a:xfrm>
+            <a:off x="4656960" y="771480"/>
+            <a:ext cx="2364120" cy="737640"/>
+          </a:xfrm>
+          <a:prstGeom prst="straightConnector1">
+            <a:avLst/>
+          </a:prstGeom>
           <a:ln>
             <a:solidFill>
               <a:srgbClr val="000000"/>
             </a:solidFill>
           </a:ln>
         </p:spPr>
-        <p:style>
-          <a:lnRef idx="0"/>
-          <a:fillRef idx="0"/>
-          <a:effectRef idx="0"/>
-          <a:fontRef idx="minor"/>
-        </p:style>
-      </p:sp>
-      <p:sp>
-        <p:nvSpPr>
-          <p:cNvPr id="55" name="CustomShape 18"/>
-          <p:cNvSpPr/>
-          <p:nvPr/>
-        </p:nvSpPr>
-        <p:spPr>
-          <a:xfrm>
-            <a:off x="5852160" y="1513080"/>
-            <a:ext cx="1919160" cy="314640"/>
-          </a:xfrm>
-          <a:prstGeom prst="rect">
-            <a:avLst/>
-          </a:prstGeom>
-          <a:noFill/>
-          <a:ln>
-            <a:noFill/>
-          </a:ln>
-        </p:spPr>
-        <p:style>
-          <a:lnRef idx="0"/>
-          <a:fillRef idx="0"/>
-          <a:effectRef idx="0"/>
-          <a:fontRef idx="minor"/>
-        </p:style>
-        <p:txBody>
-          <a:bodyPr lIns="90000" rIns="90000" tIns="45000" bIns="45000"/>
-          <a:p>
-            <a:pPr>
-              <a:lnSpc>
-                <a:spcPct val="100000"/>
-              </a:lnSpc>
-            </a:pPr>
-            <a:r>
-              <a:rPr b="0" lang="en-US" sz="1400" spc="-1" strike="noStrike">
-                <a:solidFill>
-                  <a:srgbClr val="000000"/>
-                </a:solidFill>
-                <a:latin typeface="Arial"/>
-                <a:ea typeface="DejaVu Sans"/>
-              </a:rPr>
-              <a:t>MspSensor</a:t>
-            </a:r>
-            <a:endParaRPr b="0" lang="en-US" sz="1400" spc="-1" strike="noStrike">
-              <a:latin typeface="Arial"/>
-            </a:endParaRPr>
-          </a:p>
-        </p:txBody>
-      </p:sp>
-      <p:sp>
-        <p:nvSpPr>
-          <p:cNvPr id="56" name="CustomShape 19"/>
-          <p:cNvSpPr/>
-          <p:nvPr/>
-        </p:nvSpPr>
-        <p:spPr>
-          <a:xfrm>
-            <a:off x="4656960" y="772560"/>
-            <a:ext cx="2018160" cy="781920"/>
-          </a:xfrm>
-          <a:custGeom>
-            <a:avLst/>
-            <a:gdLst/>
-            <a:ahLst/>
-            <a:rect l="l" t="t" r="r" b="b"/>
-            <a:pathLst>
-              <a:path w="21600" h="21600">
-                <a:moveTo>
-                  <a:pt x="0" y="0"/>
-                </a:moveTo>
-                <a:lnTo>
-                  <a:pt x="21600" y="21600"/>
-                </a:lnTo>
-              </a:path>
-            </a:pathLst>
-          </a:custGeom>
-          <a:noFill/>
-          <a:ln>
-            <a:solidFill>
-              <a:srgbClr val="000000"/>
-            </a:solidFill>
-          </a:ln>
-        </p:spPr>
-        <p:style>
-          <a:lnRef idx="0"/>
-          <a:fillRef idx="0"/>
-          <a:effectRef idx="0"/>
-          <a:fontRef idx="minor"/>
-        </p:style>
-      </p:sp>
-      <p:sp>
-        <p:nvSpPr>
-          <p:cNvPr id="57" name="CustomShape 20"/>
-          <p:cNvSpPr/>
-          <p:nvPr/>
-        </p:nvSpPr>
-        <p:spPr>
-          <a:xfrm>
-            <a:off x="4784400" y="1670760"/>
-            <a:ext cx="737280" cy="360"/>
-          </a:xfrm>
-          <a:custGeom>
-            <a:avLst/>
-            <a:gdLst/>
-            <a:ahLst/>
-            <a:rect l="l" t="t" r="r" b="b"/>
-            <a:pathLst>
-              <a:path w="21600" h="21600">
-                <a:moveTo>
-                  <a:pt x="0" y="0"/>
-                </a:moveTo>
-                <a:lnTo>
-                  <a:pt x="21600" y="21600"/>
-                </a:lnTo>
-              </a:path>
-            </a:pathLst>
-          </a:custGeom>
-          <a:noFill/>
-          <a:ln>
-            <a:solidFill>
-              <a:srgbClr val="000000"/>
-            </a:solidFill>
-            <a:headEnd len="med" type="triangle" w="med"/>
-            <a:tailEnd len="med" type="triangle" w="med"/>
-          </a:ln>
-        </p:spPr>
-        <p:style>
-          <a:lnRef idx="0"/>
-          <a:fillRef idx="0"/>
-          <a:effectRef idx="0"/>
-          <a:fontRef idx="minor"/>
-        </p:style>
-      </p:sp>
-      <p:sp>
-        <p:nvSpPr>
-          <p:cNvPr id="58" name="CustomShape 21"/>
-          <p:cNvSpPr/>
-          <p:nvPr/>
-        </p:nvSpPr>
-        <p:spPr>
-          <a:xfrm flipH="1">
-            <a:off x="6417000" y="1827720"/>
-            <a:ext cx="360" cy="458640"/>
-          </a:xfrm>
-          <a:custGeom>
-            <a:avLst/>
-            <a:gdLst/>
-            <a:ahLst/>
-            <a:rect l="l" t="t" r="r" b="b"/>
-            <a:pathLst>
-              <a:path w="21600" h="21600">
-                <a:moveTo>
-                  <a:pt x="0" y="0"/>
-                </a:moveTo>
-                <a:lnTo>
-                  <a:pt x="21600" y="21600"/>
-                </a:lnTo>
-              </a:path>
-            </a:pathLst>
-          </a:custGeom>
-          <a:noFill/>
-          <a:ln>
-            <a:solidFill>
-              <a:srgbClr val="000000"/>
-            </a:solidFill>
-          </a:ln>
-        </p:spPr>
-        <p:style>
-          <a:lnRef idx="0"/>
-          <a:fillRef idx="0"/>
-          <a:effectRef idx="0"/>
-          <a:fontRef idx="minor"/>
-        </p:style>
-      </p:sp>
-      <p:sp>
-        <p:nvSpPr>
-          <p:cNvPr id="59" name="CustomShape 22"/>
-          <p:cNvSpPr/>
-          <p:nvPr/>
-        </p:nvSpPr>
-        <p:spPr>
-          <a:xfrm>
-            <a:off x="5801760" y="2286000"/>
-            <a:ext cx="1513440" cy="314640"/>
-          </a:xfrm>
-          <a:prstGeom prst="rect">
-            <a:avLst/>
-          </a:prstGeom>
-          <a:noFill/>
-          <a:ln>
-            <a:noFill/>
-          </a:ln>
-        </p:spPr>
-        <p:style>
-          <a:lnRef idx="0"/>
-          <a:fillRef idx="0"/>
-          <a:effectRef idx="0"/>
-          <a:fontRef idx="minor"/>
-        </p:style>
-        <p:txBody>
-          <a:bodyPr lIns="90000" rIns="90000" tIns="45000" bIns="45000"/>
-          <a:p>
-            <a:pPr>
-              <a:lnSpc>
-                <a:spcPct val="100000"/>
-              </a:lnSpc>
-            </a:pPr>
-            <a:r>
-              <a:rPr b="0" lang="en-US" sz="1400" spc="-1" strike="noStrike">
-                <a:solidFill>
-                  <a:srgbClr val="000000"/>
-                </a:solidFill>
-                <a:latin typeface="Arial"/>
-                <a:ea typeface="DejaVu Sans"/>
-              </a:rPr>
-              <a:t>RangeAndFlow</a:t>
-            </a:r>
-            <a:endParaRPr b="0" lang="en-US" sz="1400" spc="-1" strike="noStrike">
-              <a:latin typeface="Arial"/>
-            </a:endParaRPr>
-          </a:p>
-        </p:txBody>
-      </p:sp>
+      </p:cxnSp>
     </p:spTree>
   </p:cSld>
   <p:timing>

</xml_diff>